<commit_message>
diagrams: resolved discrepancies in UML diagram for EditStudentCommand
</commit_message>
<xml_diff>
--- a/docs/diagrams/EditCommandUML.pptx
+++ b/docs/diagrams/EditCommandUML.pptx
@@ -243,7 +243,7 @@
           <a:p>
             <a:fld id="{128B42D0-5542-4246-B82D-1D330D744E73}" type="datetimeFigureOut">
               <a:rPr lang="en-IN" smtClean="0"/>
-              <a:t>24-10-2018</a:t>
+              <a:t>10-11-2018</a:t>
             </a:fld>
             <a:endParaRPr lang="en-IN"/>
           </a:p>
@@ -408,7 +408,7 @@
           <a:p>
             <a:fld id="{128B42D0-5542-4246-B82D-1D330D744E73}" type="datetimeFigureOut">
               <a:rPr lang="en-IN" smtClean="0"/>
-              <a:t>24-10-2018</a:t>
+              <a:t>10-11-2018</a:t>
             </a:fld>
             <a:endParaRPr lang="en-IN"/>
           </a:p>
@@ -583,7 +583,7 @@
           <a:p>
             <a:fld id="{128B42D0-5542-4246-B82D-1D330D744E73}" type="datetimeFigureOut">
               <a:rPr lang="en-IN" smtClean="0"/>
-              <a:t>24-10-2018</a:t>
+              <a:t>10-11-2018</a:t>
             </a:fld>
             <a:endParaRPr lang="en-IN"/>
           </a:p>
@@ -748,7 +748,7 @@
           <a:p>
             <a:fld id="{128B42D0-5542-4246-B82D-1D330D744E73}" type="datetimeFigureOut">
               <a:rPr lang="en-IN" smtClean="0"/>
-              <a:t>24-10-2018</a:t>
+              <a:t>10-11-2018</a:t>
             </a:fld>
             <a:endParaRPr lang="en-IN"/>
           </a:p>
@@ -989,7 +989,7 @@
           <a:p>
             <a:fld id="{128B42D0-5542-4246-B82D-1D330D744E73}" type="datetimeFigureOut">
               <a:rPr lang="en-IN" smtClean="0"/>
-              <a:t>24-10-2018</a:t>
+              <a:t>10-11-2018</a:t>
             </a:fld>
             <a:endParaRPr lang="en-IN"/>
           </a:p>
@@ -1216,7 +1216,7 @@
           <a:p>
             <a:fld id="{128B42D0-5542-4246-B82D-1D330D744E73}" type="datetimeFigureOut">
               <a:rPr lang="en-IN" smtClean="0"/>
-              <a:t>24-10-2018</a:t>
+              <a:t>10-11-2018</a:t>
             </a:fld>
             <a:endParaRPr lang="en-IN"/>
           </a:p>
@@ -1578,7 +1578,7 @@
           <a:p>
             <a:fld id="{128B42D0-5542-4246-B82D-1D330D744E73}" type="datetimeFigureOut">
               <a:rPr lang="en-IN" smtClean="0"/>
-              <a:t>24-10-2018</a:t>
+              <a:t>10-11-2018</a:t>
             </a:fld>
             <a:endParaRPr lang="en-IN"/>
           </a:p>
@@ -1691,7 +1691,7 @@
           <a:p>
             <a:fld id="{128B42D0-5542-4246-B82D-1D330D744E73}" type="datetimeFigureOut">
               <a:rPr lang="en-IN" smtClean="0"/>
-              <a:t>24-10-2018</a:t>
+              <a:t>10-11-2018</a:t>
             </a:fld>
             <a:endParaRPr lang="en-IN"/>
           </a:p>
@@ -1781,7 +1781,7 @@
           <a:p>
             <a:fld id="{128B42D0-5542-4246-B82D-1D330D744E73}" type="datetimeFigureOut">
               <a:rPr lang="en-IN" smtClean="0"/>
-              <a:t>24-10-2018</a:t>
+              <a:t>10-11-2018</a:t>
             </a:fld>
             <a:endParaRPr lang="en-IN"/>
           </a:p>
@@ -2053,7 +2053,7 @@
           <a:p>
             <a:fld id="{128B42D0-5542-4246-B82D-1D330D744E73}" type="datetimeFigureOut">
               <a:rPr lang="en-IN" smtClean="0"/>
-              <a:t>24-10-2018</a:t>
+              <a:t>10-11-2018</a:t>
             </a:fld>
             <a:endParaRPr lang="en-IN"/>
           </a:p>
@@ -2301,7 +2301,7 @@
           <a:p>
             <a:fld id="{128B42D0-5542-4246-B82D-1D330D744E73}" type="datetimeFigureOut">
               <a:rPr lang="en-IN" smtClean="0"/>
-              <a:t>24-10-2018</a:t>
+              <a:t>10-11-2018</a:t>
             </a:fld>
             <a:endParaRPr lang="en-IN"/>
           </a:p>
@@ -2509,7 +2509,7 @@
           <a:p>
             <a:fld id="{128B42D0-5542-4246-B82D-1D330D744E73}" type="datetimeFigureOut">
               <a:rPr lang="en-IN" smtClean="0"/>
-              <a:t>24-10-2018</a:t>
+              <a:t>10-11-2018</a:t>
             </a:fld>
             <a:endParaRPr lang="en-IN"/>
           </a:p>
@@ -2911,6 +2911,75 @@
       </p:grpSpPr>
       <p:sp>
         <p:nvSpPr>
+          <p:cNvPr id="14" name="Rectangle 8">
+            <a:extLst>
+              <a:ext uri="{FF2B5EF4-FFF2-40B4-BE49-F238E27FC236}">
+                <a16:creationId xmlns:a16="http://schemas.microsoft.com/office/drawing/2014/main" id="{B32D0D5E-CF38-42FB-A2E6-15B670D4F654}"/>
+              </a:ext>
+            </a:extLst>
+          </p:cNvPr>
+          <p:cNvSpPr/>
+          <p:nvPr/>
+        </p:nvSpPr>
+        <p:spPr>
+          <a:xfrm>
+            <a:off x="5361112" y="2063931"/>
+            <a:ext cx="1589103" cy="590268"/>
+          </a:xfrm>
+          <a:prstGeom prst="rect">
+            <a:avLst/>
+          </a:prstGeom>
+        </p:spPr>
+        <p:style>
+          <a:lnRef idx="2">
+            <a:schemeClr val="accent4">
+              <a:shade val="50000"/>
+            </a:schemeClr>
+          </a:lnRef>
+          <a:fillRef idx="1">
+            <a:schemeClr val="accent4"/>
+          </a:fillRef>
+          <a:effectRef idx="0">
+            <a:schemeClr val="accent4"/>
+          </a:effectRef>
+          <a:fontRef idx="minor">
+            <a:schemeClr val="lt1"/>
+          </a:fontRef>
+        </p:style>
+        <p:txBody>
+          <a:bodyPr rtlCol="0" anchor="ctr"/>
+          <a:lstStyle/>
+          <a:p>
+            <a:pPr algn="ctr"/>
+            <a:r>
+              <a:rPr lang="en-US" sz="1400" b="1" i="1" dirty="0">
+                <a:solidFill>
+                  <a:schemeClr val="bg1"/>
+                </a:solidFill>
+              </a:rPr>
+              <a:t>{abstract}</a:t>
+            </a:r>
+          </a:p>
+          <a:p>
+            <a:pPr algn="ctr"/>
+            <a:r>
+              <a:rPr lang="en-US" sz="1400" b="1" i="1" dirty="0">
+                <a:solidFill>
+                  <a:schemeClr val="bg1"/>
+                </a:solidFill>
+              </a:rPr>
+              <a:t>Command</a:t>
+            </a:r>
+            <a:endParaRPr lang="en-SG" sz="1200" b="1" i="1" dirty="0">
+              <a:solidFill>
+                <a:schemeClr val="bg1"/>
+              </a:solidFill>
+            </a:endParaRPr>
+          </a:p>
+        </p:txBody>
+      </p:sp>
+      <p:sp>
+        <p:nvSpPr>
           <p:cNvPr id="7" name="Rectangle 8"/>
           <p:cNvSpPr/>
           <p:nvPr/>
@@ -3033,58 +3102,6 @@
           <a:p>
             <a:pPr algn="ctr"/>
             <a:endParaRPr lang="en-IN">
-              <a:solidFill>
-                <a:schemeClr val="bg1"/>
-              </a:solidFill>
-            </a:endParaRPr>
-          </a:p>
-        </p:txBody>
-      </p:sp>
-      <p:sp>
-        <p:nvSpPr>
-          <p:cNvPr id="10" name="Rectangle 8"/>
-          <p:cNvSpPr/>
-          <p:nvPr/>
-        </p:nvSpPr>
-        <p:spPr>
-          <a:xfrm>
-            <a:off x="5361112" y="2307439"/>
-            <a:ext cx="1589103" cy="346760"/>
-          </a:xfrm>
-          <a:prstGeom prst="rect">
-            <a:avLst/>
-          </a:prstGeom>
-        </p:spPr>
-        <p:style>
-          <a:lnRef idx="2">
-            <a:schemeClr val="accent4">
-              <a:shade val="50000"/>
-            </a:schemeClr>
-          </a:lnRef>
-          <a:fillRef idx="1">
-            <a:schemeClr val="accent4"/>
-          </a:fillRef>
-          <a:effectRef idx="0">
-            <a:schemeClr val="accent4"/>
-          </a:effectRef>
-          <a:fontRef idx="minor">
-            <a:schemeClr val="lt1"/>
-          </a:fontRef>
-        </p:style>
-        <p:txBody>
-          <a:bodyPr rtlCol="0" anchor="ctr"/>
-          <a:lstStyle/>
-          <a:p>
-            <a:pPr algn="ctr"/>
-            <a:r>
-              <a:rPr lang="en-US" sz="1400" b="1" i="1" dirty="0">
-                <a:solidFill>
-                  <a:schemeClr val="bg1"/>
-                </a:solidFill>
-              </a:rPr>
-              <a:t>Command</a:t>
-            </a:r>
-            <a:endParaRPr lang="en-SG" sz="1200" b="1" i="1" dirty="0">
               <a:solidFill>
                 <a:schemeClr val="bg1"/>
               </a:solidFill>

</xml_diff>